<commit_message>
updated Action A with heights
</commit_message>
<xml_diff>
--- a/IDPA/IDPA  - ISA - January 2019/Action Bay, A.pptx
+++ b/IDPA/IDPA  - ISA - January 2019/Action Bay, A.pptx
@@ -16500,8 +16500,8 @@
         </p:nvSpPr>
         <p:spPr>
           <a:xfrm>
-            <a:off x="838199" y="1447800"/>
-            <a:ext cx="5638800" cy="2246769"/>
+            <a:off x="784325" y="997066"/>
+            <a:ext cx="5638800" cy="2677656"/>
           </a:xfrm>
           <a:prstGeom prst="rect">
             <a:avLst/>
@@ -16513,6 +16513,15 @@
             <a:spAutoFit/>
           </a:bodyPr>
           <a:lstStyle/>
+          <a:p>
+            <a:r>
+              <a:rPr lang="en-US" sz="1400" dirty="0"/>
+              <a:t>T1, T2, T3 need to be no taller that 2 ft.</a:t>
+            </a:r>
+          </a:p>
+          <a:p>
+            <a:endParaRPr lang="en-US" sz="1400" dirty="0"/>
+          </a:p>
           <a:p>
             <a:r>
               <a:rPr lang="en-US" sz="1400" dirty="0"/>
@@ -17327,7 +17336,7 @@
         <p:spPr>
           <a:xfrm>
             <a:off x="2089793" y="4476189"/>
-            <a:ext cx="2642775" cy="369332"/>
+            <a:ext cx="4771563" cy="369332"/>
           </a:xfrm>
           <a:prstGeom prst="rect">
             <a:avLst/>
@@ -17342,7 +17351,7 @@
           <a:p>
             <a:r>
               <a:rPr lang="en-US" dirty="0"/>
-              <a:t>4x         Standard Target</a:t>
+              <a:t>4x         Standard Target (3 no taller than 2 ft)</a:t>
             </a:r>
           </a:p>
         </p:txBody>

</xml_diff>

<commit_message>
Small fixes for JAN ISA match
</commit_message>
<xml_diff>
--- a/IDPA/IDPA  - ISA - January 2019/Action Bay, A.pptx
+++ b/IDPA/IDPA  - ISA - January 2019/Action Bay, A.pptx
@@ -336,7 +336,7 @@
               <a:pPr>
                 <a:defRPr/>
               </a:pPr>
-              <a:t>23.12.2018</a:t>
+              <a:t>01.01.2019</a:t>
             </a:fld>
             <a:endParaRPr lang="en-US"/>
           </a:p>
@@ -4312,14 +4312,14 @@
           <p:nvPr>
             <p:extLst>
               <p:ext uri="{D42A27DB-BD31-4B8C-83A1-F6EECF244321}">
-                <p14:modId xmlns:p14="http://schemas.microsoft.com/office/powerpoint/2010/main" val="3747575539"/>
+                <p14:modId xmlns:p14="http://schemas.microsoft.com/office/powerpoint/2010/main" val="201846385"/>
               </p:ext>
             </p:extLst>
           </p:nvPr>
         </p:nvGraphicFramePr>
         <p:xfrm>
           <a:off x="152400" y="152400"/>
-          <a:ext cx="7010400" cy="4017743"/>
+          <a:ext cx="7010400" cy="4187954"/>
         </p:xfrm>
         <a:graphic>
           <a:graphicData uri="http://schemas.openxmlformats.org/drawingml/2006/table">
@@ -4734,7 +4734,7 @@
                           <a:ea typeface="ＭＳ Ｐゴシック" pitchFamily="-112" charset="-128"/>
                           <a:cs typeface="Times New Roman" pitchFamily="-112" charset="0"/>
                         </a:rPr>
-                        <a:t>SCENARIO: You’ve been out shopping, you come home to find some hooligans. They have 3 of your families hostage. Drop off your groceries in the box and save your family!</a:t>
+                        <a:t>SCENARIO: You’ve been out shopping, you come home to find some hooligans. They have 3 of your families hostage. Ring the doorbell to distract them from your family. Drop off your groceries in the box and save your family!</a:t>
                       </a:r>
                     </a:p>
                   </a:txBody>
@@ -4857,7 +4857,7 @@
                           <a:ea typeface="ＭＳ Ｐゴシック" pitchFamily="-112" charset="-128"/>
                           <a:cs typeface="Times New Roman" pitchFamily="-112" charset="0"/>
                         </a:rPr>
-                        <a:t>START POSITION: Standing at Start position, gun loaded on table pointed at T1, trigger over tape, grocery bag in strong hand.</a:t>
+                        <a:t>START POSITION: Standing at Start position, gun loaded and holstered, grocery bag in weak hand.</a:t>
                       </a:r>
                     </a:p>
                   </a:txBody>
@@ -5248,7 +5248,40 @@
                           <a:ea typeface="ＭＳ Ｐゴシック" pitchFamily="-112" charset="-128"/>
                           <a:cs typeface="Times New Roman" pitchFamily="-112" charset="0"/>
                         </a:rPr>
-                        <a:t>SO NOTES: Please not the bay is a 270 degree bay. The 180 does not apply in this bay, but Safe Cones are laid out.</a:t>
+                        <a:t>SO NOTES: Please not the bay is a 270 degree bay. The 180 does not apply for this stage, but Safe Cones are laid out.</a:t>
+                      </a:r>
+                    </a:p>
+                    <a:p>
+                      <a:pPr marL="0" marR="0" lvl="0" indent="0" algn="l" defTabSz="966788" rtl="0" eaLnBrk="0" fontAlgn="base" latinLnBrk="0" hangingPunct="0">
+                        <a:lnSpc>
+                          <a:spcPct val="100000"/>
+                        </a:lnSpc>
+                        <a:spcBef>
+                          <a:spcPct val="0"/>
+                        </a:spcBef>
+                        <a:spcAft>
+                          <a:spcPct val="0"/>
+                        </a:spcAft>
+                        <a:buClrTx/>
+                        <a:buSzTx/>
+                        <a:buFontTx/>
+                        <a:buNone/>
+                        <a:tabLst/>
+                      </a:pPr>
+                      <a:r>
+                        <a:rPr kumimoji="0" lang="en-US" sz="1100" b="1" i="0" u="none" strike="noStrike" cap="none" normalizeH="0" baseline="0" dirty="0">
+                          <a:ln>
+                            <a:noFill/>
+                          </a:ln>
+                          <a:solidFill>
+                            <a:schemeClr val="tx1"/>
+                          </a:solidFill>
+                          <a:effectLst/>
+                          <a:latin typeface="Arial" charset="0"/>
+                          <a:ea typeface="ＭＳ Ｐゴシック" pitchFamily="-112" charset="-128"/>
+                          <a:cs typeface="Times New Roman" pitchFamily="-112" charset="0"/>
+                        </a:rPr>
+                        <a:t>Hold the time against the orange marking on the wall, button facing shooter for easy access.</a:t>
                       </a:r>
                     </a:p>
                   </a:txBody>
@@ -5351,7 +5384,7 @@
                           <a:ea typeface="ＭＳ Ｐゴシック" pitchFamily="-112" charset="-128"/>
                           <a:cs typeface="Times New Roman" pitchFamily="-112" charset="0"/>
                         </a:rPr>
-                        <a:t>STAGE PROCEDURE: On start signal, retrieve gun and engage T1, T2, and T3 with weak hand only, carrying groceries in strong hand.</a:t>
+                        <a:t>STAGE PROCEDURE: Upon being told to start, move to the start timer and press the timer. After the beep you may draw your firearm and engage targets from available cover.</a:t>
                       </a:r>
                     </a:p>
                     <a:p>
@@ -5384,7 +5417,7 @@
                           <a:ea typeface="ＭＳ Ｐゴシック" pitchFamily="-112" charset="-128"/>
                           <a:cs typeface="Times New Roman" pitchFamily="-112" charset="0"/>
                         </a:rPr>
-                        <a:t>Then deposit groceries in the box.</a:t>
+                        <a:t>T1, T2, and T3 with strong hand only. </a:t>
                       </a:r>
                     </a:p>
                     <a:p>
@@ -5417,40 +5450,7 @@
                           <a:ea typeface="ＭＳ Ｐゴシック" pitchFamily="-112" charset="-128"/>
                           <a:cs typeface="Times New Roman" pitchFamily="-112" charset="0"/>
                         </a:rPr>
-                        <a:t>At P1, engage T4, T5, T6, T7.</a:t>
-                      </a:r>
-                    </a:p>
-                    <a:p>
-                      <a:pPr marL="0" marR="0" lvl="0" indent="0" algn="l" defTabSz="966788" rtl="0" eaLnBrk="1" fontAlgn="base" latinLnBrk="0" hangingPunct="1">
-                        <a:lnSpc>
-                          <a:spcPct val="100000"/>
-                        </a:lnSpc>
-                        <a:spcBef>
-                          <a:spcPct val="20000"/>
-                        </a:spcBef>
-                        <a:spcAft>
-                          <a:spcPct val="0"/>
-                        </a:spcAft>
-                        <a:buClrTx/>
-                        <a:buSzTx/>
-                        <a:buFontTx/>
-                        <a:buNone/>
-                        <a:tabLst/>
-                      </a:pPr>
-                      <a:r>
-                        <a:rPr kumimoji="0" lang="en-US" sz="1100" b="1" i="0" u="none" strike="noStrike" cap="none" normalizeH="0" baseline="0" dirty="0">
-                          <a:ln>
-                            <a:noFill/>
-                          </a:ln>
-                          <a:solidFill>
-                            <a:schemeClr val="tx1"/>
-                          </a:solidFill>
-                          <a:effectLst/>
-                          <a:latin typeface="Arial" charset="0"/>
-                          <a:ea typeface="ＭＳ Ｐゴシック" pitchFamily="-112" charset="-128"/>
-                          <a:cs typeface="Times New Roman" pitchFamily="-112" charset="0"/>
-                        </a:rPr>
-                        <a:t>Move to P2 and engage T8 and T9</a:t>
+                        <a:t>Deposit groceries in the drop area.</a:t>
                       </a:r>
                     </a:p>
                   </a:txBody>
@@ -5553,13 +5553,14 @@
           </p:cNvPr>
           <p:cNvCxnSpPr>
             <a:cxnSpLocks/>
+            <a:stCxn id="27" idx="3"/>
           </p:cNvCxnSpPr>
           <p:nvPr/>
         </p:nvCxnSpPr>
         <p:spPr>
-          <a:xfrm flipH="1">
-            <a:off x="809625" y="8803970"/>
-            <a:ext cx="609599" cy="0"/>
+          <a:xfrm flipH="1" flipV="1">
+            <a:off x="221429" y="9248407"/>
+            <a:ext cx="576976" cy="184666"/>
           </a:xfrm>
           <a:prstGeom prst="line">
             <a:avLst/>
@@ -5600,7 +5601,7 @@
         </p:nvSpPr>
         <p:spPr>
           <a:xfrm>
-            <a:off x="1292227" y="6409501"/>
+            <a:off x="1276350" y="6209678"/>
             <a:ext cx="533400" cy="369332"/>
           </a:xfrm>
           <a:prstGeom prst="rect">
@@ -5636,7 +5637,7 @@
         </p:nvSpPr>
         <p:spPr>
           <a:xfrm>
-            <a:off x="386070" y="7459930"/>
+            <a:off x="22244" y="4655810"/>
             <a:ext cx="533400" cy="369332"/>
           </a:xfrm>
           <a:prstGeom prst="rect">
@@ -5981,7 +5982,7 @@
         </p:nvCxnSpPr>
         <p:spPr>
           <a:xfrm flipH="1">
-            <a:off x="1076328" y="6201184"/>
+            <a:off x="1076328" y="6250538"/>
             <a:ext cx="676280" cy="0"/>
           </a:xfrm>
           <a:prstGeom prst="line">
@@ -6023,7 +6024,7 @@
         </p:nvSpPr>
         <p:spPr>
           <a:xfrm>
-            <a:off x="3512966" y="5894023"/>
+            <a:off x="3512966" y="6171977"/>
             <a:ext cx="533400" cy="369332"/>
           </a:xfrm>
           <a:prstGeom prst="rect">
@@ -6061,7 +6062,7 @@
         </p:nvCxnSpPr>
         <p:spPr>
           <a:xfrm flipH="1" flipV="1">
-            <a:off x="3962400" y="5708141"/>
+            <a:off x="3962400" y="5986095"/>
             <a:ext cx="39432" cy="616459"/>
           </a:xfrm>
           <a:prstGeom prst="line">
@@ -6103,7 +6104,7 @@
         </p:nvSpPr>
         <p:spPr>
           <a:xfrm>
-            <a:off x="781049" y="8956370"/>
+            <a:off x="36404" y="9248407"/>
             <a:ext cx="762001" cy="369332"/>
           </a:xfrm>
           <a:prstGeom prst="rect">
@@ -6139,7 +6140,7 @@
         </p:nvSpPr>
         <p:spPr>
           <a:xfrm>
-            <a:off x="386070" y="6582672"/>
+            <a:off x="344600" y="4419600"/>
             <a:ext cx="533400" cy="369332"/>
           </a:xfrm>
           <a:prstGeom prst="rect">
@@ -6174,7 +6175,7 @@
         </p:nvSpPr>
         <p:spPr>
           <a:xfrm>
-            <a:off x="348681" y="5835159"/>
+            <a:off x="1038653" y="4749616"/>
             <a:ext cx="533400" cy="369332"/>
           </a:xfrm>
           <a:prstGeom prst="rect">
@@ -6209,7 +6210,7 @@
         </p:nvSpPr>
         <p:spPr>
           <a:xfrm>
-            <a:off x="1303072" y="4245317"/>
+            <a:off x="1303072" y="4523271"/>
             <a:ext cx="533400" cy="369332"/>
           </a:xfrm>
           <a:prstGeom prst="rect">
@@ -6244,7 +6245,7 @@
         </p:nvSpPr>
         <p:spPr>
           <a:xfrm>
-            <a:off x="2502795" y="4159422"/>
+            <a:off x="2502795" y="4437376"/>
             <a:ext cx="533400" cy="369332"/>
           </a:xfrm>
           <a:prstGeom prst="rect">
@@ -6349,7 +6350,7 @@
         </p:nvSpPr>
         <p:spPr>
           <a:xfrm>
-            <a:off x="4359771" y="4211152"/>
+            <a:off x="4359771" y="4489106"/>
             <a:ext cx="504532" cy="369332"/>
           </a:xfrm>
           <a:prstGeom prst="rect">
@@ -6384,7 +6385,7 @@
         </p:nvSpPr>
         <p:spPr>
           <a:xfrm>
-            <a:off x="3380708" y="4153576"/>
+            <a:off x="3380708" y="4431530"/>
             <a:ext cx="533400" cy="369332"/>
           </a:xfrm>
           <a:prstGeom prst="rect">
@@ -6421,7 +6422,7 @@
         </p:nvGrpSpPr>
         <p:grpSpPr bwMode="auto">
           <a:xfrm flipH="1">
-            <a:off x="220310" y="7612329"/>
+            <a:off x="170505" y="5086863"/>
             <a:ext cx="222250" cy="858838"/>
             <a:chOff x="384" y="816"/>
             <a:chExt cx="140" cy="541"/>
@@ -6711,7 +6712,7 @@
         </p:nvGrpSpPr>
         <p:grpSpPr bwMode="auto">
           <a:xfrm flipH="1">
-            <a:off x="226660" y="6055822"/>
+            <a:off x="792055" y="4717889"/>
             <a:ext cx="222250" cy="858838"/>
             <a:chOff x="384" y="816"/>
             <a:chExt cx="140" cy="541"/>
@@ -7001,7 +7002,7 @@
         </p:nvGrpSpPr>
         <p:grpSpPr bwMode="auto">
           <a:xfrm flipH="1">
-            <a:off x="226660" y="6790835"/>
+            <a:off x="475334" y="4792573"/>
             <a:ext cx="222250" cy="858838"/>
             <a:chOff x="384" y="816"/>
             <a:chExt cx="140" cy="541"/>
@@ -7481,203 +7482,6 @@
       </p:sp>
       <p:grpSp>
         <p:nvGrpSpPr>
-          <p:cNvPr id="61" name="Group 60">
-            <a:extLst>
-              <a:ext uri="{FF2B5EF4-FFF2-40B4-BE49-F238E27FC236}">
-                <a16:creationId xmlns:a16="http://schemas.microsoft.com/office/drawing/2014/main" id="{7CB7D39F-3937-4030-8CEC-D9533E82A9F0}"/>
-              </a:ext>
-            </a:extLst>
-          </p:cNvPr>
-          <p:cNvGrpSpPr/>
-          <p:nvPr/>
-        </p:nvGrpSpPr>
-        <p:grpSpPr>
-          <a:xfrm>
-            <a:off x="1484388" y="6956182"/>
-            <a:ext cx="268136" cy="192317"/>
-            <a:chOff x="-2113628" y="7503096"/>
-            <a:chExt cx="268136" cy="192317"/>
-          </a:xfrm>
-        </p:grpSpPr>
-        <p:cxnSp>
-          <p:nvCxnSpPr>
-            <p:cNvPr id="20" name="Straight Connector 19">
-              <a:extLst>
-                <a:ext uri="{FF2B5EF4-FFF2-40B4-BE49-F238E27FC236}">
-                  <a16:creationId xmlns:a16="http://schemas.microsoft.com/office/drawing/2014/main" id="{84252726-E5A4-4AE0-A019-A8D51313B6DB}"/>
-                </a:ext>
-              </a:extLst>
-            </p:cNvPr>
-            <p:cNvCxnSpPr>
-              <a:cxnSpLocks/>
-            </p:cNvCxnSpPr>
-            <p:nvPr/>
-          </p:nvCxnSpPr>
-          <p:spPr>
-            <a:xfrm flipH="1">
-              <a:off x="-2113628" y="7503097"/>
-              <a:ext cx="245473" cy="0"/>
-            </a:xfrm>
-            <a:prstGeom prst="line">
-              <a:avLst/>
-            </a:prstGeom>
-            <a:ln>
-              <a:solidFill>
-                <a:srgbClr val="FF0000"/>
-              </a:solidFill>
-            </a:ln>
-            <a:effectLst/>
-          </p:spPr>
-          <p:style>
-            <a:lnRef idx="2">
-              <a:schemeClr val="accent1"/>
-            </a:lnRef>
-            <a:fillRef idx="0">
-              <a:schemeClr val="accent1"/>
-            </a:fillRef>
-            <a:effectRef idx="1">
-              <a:schemeClr val="accent1"/>
-            </a:effectRef>
-            <a:fontRef idx="minor">
-              <a:schemeClr val="tx1"/>
-            </a:fontRef>
-          </p:style>
-        </p:cxnSp>
-        <p:cxnSp>
-          <p:nvCxnSpPr>
-            <p:cNvPr id="52" name="Straight Connector 51">
-              <a:extLst>
-                <a:ext uri="{FF2B5EF4-FFF2-40B4-BE49-F238E27FC236}">
-                  <a16:creationId xmlns:a16="http://schemas.microsoft.com/office/drawing/2014/main" id="{13B34446-F568-436A-9F0C-502552D5302D}"/>
-                </a:ext>
-              </a:extLst>
-            </p:cNvPr>
-            <p:cNvCxnSpPr>
-              <a:cxnSpLocks/>
-            </p:cNvCxnSpPr>
-            <p:nvPr/>
-          </p:nvCxnSpPr>
-          <p:spPr>
-            <a:xfrm flipH="1">
-              <a:off x="-2090965" y="7695413"/>
-              <a:ext cx="245473" cy="0"/>
-            </a:xfrm>
-            <a:prstGeom prst="line">
-              <a:avLst/>
-            </a:prstGeom>
-            <a:ln>
-              <a:solidFill>
-                <a:srgbClr val="FF0000"/>
-              </a:solidFill>
-            </a:ln>
-            <a:effectLst/>
-          </p:spPr>
-          <p:style>
-            <a:lnRef idx="2">
-              <a:schemeClr val="accent1"/>
-            </a:lnRef>
-            <a:fillRef idx="0">
-              <a:schemeClr val="accent1"/>
-            </a:fillRef>
-            <a:effectRef idx="1">
-              <a:schemeClr val="accent1"/>
-            </a:effectRef>
-            <a:fontRef idx="minor">
-              <a:schemeClr val="tx1"/>
-            </a:fontRef>
-          </p:style>
-        </p:cxnSp>
-        <p:cxnSp>
-          <p:nvCxnSpPr>
-            <p:cNvPr id="57" name="Straight Connector 56">
-              <a:extLst>
-                <a:ext uri="{FF2B5EF4-FFF2-40B4-BE49-F238E27FC236}">
-                  <a16:creationId xmlns:a16="http://schemas.microsoft.com/office/drawing/2014/main" id="{03D80C1A-A527-4190-9259-ED5184DDC5D6}"/>
-                </a:ext>
-              </a:extLst>
-            </p:cNvPr>
-            <p:cNvCxnSpPr>
-              <a:cxnSpLocks/>
-            </p:cNvCxnSpPr>
-            <p:nvPr/>
-          </p:nvCxnSpPr>
-          <p:spPr>
-            <a:xfrm>
-              <a:off x="-1880954" y="7503097"/>
-              <a:ext cx="0" cy="172751"/>
-            </a:xfrm>
-            <a:prstGeom prst="line">
-              <a:avLst/>
-            </a:prstGeom>
-            <a:ln>
-              <a:solidFill>
-                <a:srgbClr val="FF0000"/>
-              </a:solidFill>
-            </a:ln>
-            <a:effectLst/>
-          </p:spPr>
-          <p:style>
-            <a:lnRef idx="2">
-              <a:schemeClr val="accent1"/>
-            </a:lnRef>
-            <a:fillRef idx="0">
-              <a:schemeClr val="accent1"/>
-            </a:fillRef>
-            <a:effectRef idx="1">
-              <a:schemeClr val="accent1"/>
-            </a:effectRef>
-            <a:fontRef idx="minor">
-              <a:schemeClr val="tx1"/>
-            </a:fontRef>
-          </p:style>
-        </p:cxnSp>
-        <p:cxnSp>
-          <p:nvCxnSpPr>
-            <p:cNvPr id="60" name="Straight Connector 59">
-              <a:extLst>
-                <a:ext uri="{FF2B5EF4-FFF2-40B4-BE49-F238E27FC236}">
-                  <a16:creationId xmlns:a16="http://schemas.microsoft.com/office/drawing/2014/main" id="{0528FDA4-5458-43C3-931E-0E94FBD9403B}"/>
-                </a:ext>
-              </a:extLst>
-            </p:cNvPr>
-            <p:cNvCxnSpPr>
-              <a:cxnSpLocks/>
-            </p:cNvCxnSpPr>
-            <p:nvPr/>
-          </p:nvCxnSpPr>
-          <p:spPr>
-            <a:xfrm>
-              <a:off x="-2084142" y="7503096"/>
-              <a:ext cx="0" cy="172751"/>
-            </a:xfrm>
-            <a:prstGeom prst="line">
-              <a:avLst/>
-            </a:prstGeom>
-            <a:ln>
-              <a:solidFill>
-                <a:srgbClr val="FF0000"/>
-              </a:solidFill>
-            </a:ln>
-            <a:effectLst/>
-          </p:spPr>
-          <p:style>
-            <a:lnRef idx="2">
-              <a:schemeClr val="accent1"/>
-            </a:lnRef>
-            <a:fillRef idx="0">
-              <a:schemeClr val="accent1"/>
-            </a:fillRef>
-            <a:effectRef idx="1">
-              <a:schemeClr val="accent1"/>
-            </a:effectRef>
-            <a:fontRef idx="minor">
-              <a:schemeClr val="tx1"/>
-            </a:fontRef>
-          </p:style>
-        </p:cxnSp>
-      </p:grpSp>
-      <p:grpSp>
-        <p:nvGrpSpPr>
           <p:cNvPr id="68" name="Group 342">
             <a:extLst>
               <a:ext uri="{FF2B5EF4-FFF2-40B4-BE49-F238E27FC236}">
@@ -7692,7 +7496,7 @@
         </p:nvGrpSpPr>
         <p:grpSpPr bwMode="auto">
           <a:xfrm flipH="1">
-            <a:off x="2286895" y="4272650"/>
+            <a:off x="2286895" y="4550604"/>
             <a:ext cx="227013" cy="869950"/>
             <a:chOff x="1104" y="768"/>
             <a:chExt cx="143" cy="548"/>
@@ -8108,329 +7912,6 @@
             </p:txBody>
           </p:sp>
         </p:grpSp>
-      </p:grpSp>
-      <p:grpSp>
-        <p:nvGrpSpPr>
-          <p:cNvPr id="100" name="Group 175">
-            <a:extLst>
-              <a:ext uri="{FF2B5EF4-FFF2-40B4-BE49-F238E27FC236}">
-                <a16:creationId xmlns:a16="http://schemas.microsoft.com/office/drawing/2014/main" id="{AFC21B0A-AE42-4EC6-A023-A8114167C5B9}"/>
-              </a:ext>
-            </a:extLst>
-          </p:cNvPr>
-          <p:cNvGrpSpPr>
-            <a:grpSpLocks/>
-          </p:cNvGrpSpPr>
-          <p:nvPr/>
-        </p:nvGrpSpPr>
-        <p:grpSpPr bwMode="auto">
-          <a:xfrm>
-            <a:off x="601489" y="8155419"/>
-            <a:ext cx="490538" cy="666750"/>
-            <a:chOff x="1176" y="5328"/>
-            <a:chExt cx="309" cy="420"/>
-          </a:xfrm>
-        </p:grpSpPr>
-        <p:sp>
-          <p:nvSpPr>
-            <p:cNvPr id="107" name="Line 176">
-              <a:extLst>
-                <a:ext uri="{FF2B5EF4-FFF2-40B4-BE49-F238E27FC236}">
-                  <a16:creationId xmlns:a16="http://schemas.microsoft.com/office/drawing/2014/main" id="{6C885ADC-AB65-494B-99C7-7141764230A1}"/>
-                </a:ext>
-              </a:extLst>
-            </p:cNvPr>
-            <p:cNvSpPr>
-              <a:spLocks noChangeShapeType="1"/>
-            </p:cNvSpPr>
-            <p:nvPr/>
-          </p:nvSpPr>
-          <p:spPr bwMode="auto">
-            <a:xfrm>
-              <a:off x="1478" y="5427"/>
-              <a:ext cx="0" cy="182"/>
-            </a:xfrm>
-            <a:prstGeom prst="line">
-              <a:avLst/>
-            </a:prstGeom>
-            <a:noFill/>
-            <a:ln w="25400">
-              <a:solidFill>
-                <a:schemeClr val="tx1"/>
-              </a:solidFill>
-              <a:round/>
-              <a:headEnd/>
-              <a:tailEnd/>
-            </a:ln>
-            <a:extLst>
-              <a:ext uri="{909E8E84-426E-40DD-AFC4-6F175D3DCCD1}">
-                <a14:hiddenFill xmlns:a14="http://schemas.microsoft.com/office/drawing/2010/main">
-                  <a:noFill/>
-                </a14:hiddenFill>
-              </a:ext>
-            </a:extLst>
-          </p:spPr>
-          <p:txBody>
-            <a:bodyPr wrap="none" lIns="0" tIns="0" rIns="0" bIns="0" anchor="ctr">
-              <a:spAutoFit/>
-            </a:bodyPr>
-            <a:lstStyle/>
-            <a:p>
-              <a:endParaRPr lang="en-US"/>
-            </a:p>
-          </p:txBody>
-        </p:sp>
-        <p:sp>
-          <p:nvSpPr>
-            <p:cNvPr id="108" name="Line 177">
-              <a:extLst>
-                <a:ext uri="{FF2B5EF4-FFF2-40B4-BE49-F238E27FC236}">
-                  <a16:creationId xmlns:a16="http://schemas.microsoft.com/office/drawing/2014/main" id="{A034C54D-3B37-403B-9E35-BAD89597C9EE}"/>
-                </a:ext>
-              </a:extLst>
-            </p:cNvPr>
-            <p:cNvSpPr>
-              <a:spLocks noChangeShapeType="1"/>
-            </p:cNvSpPr>
-            <p:nvPr/>
-          </p:nvSpPr>
-          <p:spPr bwMode="auto">
-            <a:xfrm>
-              <a:off x="1359" y="5351"/>
-              <a:ext cx="0" cy="227"/>
-            </a:xfrm>
-            <a:prstGeom prst="line">
-              <a:avLst/>
-            </a:prstGeom>
-            <a:noFill/>
-            <a:ln w="25400">
-              <a:solidFill>
-                <a:schemeClr val="tx1"/>
-              </a:solidFill>
-              <a:round/>
-              <a:headEnd/>
-              <a:tailEnd/>
-            </a:ln>
-            <a:extLst>
-              <a:ext uri="{909E8E84-426E-40DD-AFC4-6F175D3DCCD1}">
-                <a14:hiddenFill xmlns:a14="http://schemas.microsoft.com/office/drawing/2010/main">
-                  <a:noFill/>
-                </a14:hiddenFill>
-              </a:ext>
-            </a:extLst>
-          </p:spPr>
-          <p:txBody>
-            <a:bodyPr wrap="none" lIns="0" tIns="0" rIns="0" bIns="0" anchor="ctr">
-              <a:spAutoFit/>
-            </a:bodyPr>
-            <a:lstStyle/>
-            <a:p>
-              <a:endParaRPr lang="en-US"/>
-            </a:p>
-          </p:txBody>
-        </p:sp>
-        <p:sp>
-          <p:nvSpPr>
-            <p:cNvPr id="109" name="Freeform 178">
-              <a:extLst>
-                <a:ext uri="{FF2B5EF4-FFF2-40B4-BE49-F238E27FC236}">
-                  <a16:creationId xmlns:a16="http://schemas.microsoft.com/office/drawing/2014/main" id="{F5436166-B1F2-45F9-BAF2-1157404C889D}"/>
-                </a:ext>
-              </a:extLst>
-            </p:cNvPr>
-            <p:cNvSpPr>
-              <a:spLocks/>
-            </p:cNvSpPr>
-            <p:nvPr/>
-          </p:nvSpPr>
-          <p:spPr bwMode="auto">
-            <a:xfrm>
-              <a:off x="1176" y="5328"/>
-              <a:ext cx="309" cy="238"/>
-            </a:xfrm>
-            <a:custGeom>
-              <a:avLst/>
-              <a:gdLst>
-                <a:gd name="T0" fmla="*/ 0 w 309"/>
-                <a:gd name="T1" fmla="*/ 108 h 238"/>
-                <a:gd name="T2" fmla="*/ 113 w 309"/>
-                <a:gd name="T3" fmla="*/ 238 h 238"/>
-                <a:gd name="T4" fmla="*/ 309 w 309"/>
-                <a:gd name="T5" fmla="*/ 93 h 238"/>
-                <a:gd name="T6" fmla="*/ 183 w 309"/>
-                <a:gd name="T7" fmla="*/ 0 h 238"/>
-                <a:gd name="T8" fmla="*/ 0 w 309"/>
-                <a:gd name="T9" fmla="*/ 108 h 238"/>
-                <a:gd name="T10" fmla="*/ 0 60000 65536"/>
-                <a:gd name="T11" fmla="*/ 0 60000 65536"/>
-                <a:gd name="T12" fmla="*/ 0 60000 65536"/>
-                <a:gd name="T13" fmla="*/ 0 60000 65536"/>
-                <a:gd name="T14" fmla="*/ 0 60000 65536"/>
-                <a:gd name="T15" fmla="*/ 0 w 309"/>
-                <a:gd name="T16" fmla="*/ 0 h 238"/>
-                <a:gd name="T17" fmla="*/ 309 w 309"/>
-                <a:gd name="T18" fmla="*/ 238 h 238"/>
-              </a:gdLst>
-              <a:ahLst/>
-              <a:cxnLst>
-                <a:cxn ang="T10">
-                  <a:pos x="T0" y="T1"/>
-                </a:cxn>
-                <a:cxn ang="T11">
-                  <a:pos x="T2" y="T3"/>
-                </a:cxn>
-                <a:cxn ang="T12">
-                  <a:pos x="T4" y="T5"/>
-                </a:cxn>
-                <a:cxn ang="T13">
-                  <a:pos x="T6" y="T7"/>
-                </a:cxn>
-                <a:cxn ang="T14">
-                  <a:pos x="T8" y="T9"/>
-                </a:cxn>
-              </a:cxnLst>
-              <a:rect l="T15" t="T16" r="T17" b="T18"/>
-              <a:pathLst>
-                <a:path w="309" h="238">
-                  <a:moveTo>
-                    <a:pt x="0" y="108"/>
-                  </a:moveTo>
-                  <a:lnTo>
-                    <a:pt x="113" y="238"/>
-                  </a:lnTo>
-                  <a:lnTo>
-                    <a:pt x="309" y="93"/>
-                  </a:lnTo>
-                  <a:lnTo>
-                    <a:pt x="183" y="0"/>
-                  </a:lnTo>
-                  <a:lnTo>
-                    <a:pt x="0" y="108"/>
-                  </a:lnTo>
-                  <a:close/>
-                </a:path>
-              </a:pathLst>
-            </a:custGeom>
-            <a:solidFill>
-              <a:schemeClr val="accent1"/>
-            </a:solidFill>
-            <a:ln w="9525">
-              <a:solidFill>
-                <a:schemeClr val="tx1"/>
-              </a:solidFill>
-              <a:round/>
-              <a:headEnd/>
-              <a:tailEnd/>
-            </a:ln>
-          </p:spPr>
-          <p:txBody>
-            <a:bodyPr wrap="none" lIns="0" tIns="0" rIns="0" bIns="0" anchor="ctr">
-              <a:spAutoFit/>
-            </a:bodyPr>
-            <a:lstStyle/>
-            <a:p>
-              <a:endParaRPr lang="en-US"/>
-            </a:p>
-          </p:txBody>
-        </p:sp>
-        <p:sp>
-          <p:nvSpPr>
-            <p:cNvPr id="110" name="Line 179">
-              <a:extLst>
-                <a:ext uri="{FF2B5EF4-FFF2-40B4-BE49-F238E27FC236}">
-                  <a16:creationId xmlns:a16="http://schemas.microsoft.com/office/drawing/2014/main" id="{A28CA855-07C5-4822-98AF-D68CDD90D6D7}"/>
-                </a:ext>
-              </a:extLst>
-            </p:cNvPr>
-            <p:cNvSpPr>
-              <a:spLocks noChangeShapeType="1"/>
-            </p:cNvSpPr>
-            <p:nvPr/>
-          </p:nvSpPr>
-          <p:spPr bwMode="auto">
-            <a:xfrm>
-              <a:off x="1294" y="5566"/>
-              <a:ext cx="0" cy="182"/>
-            </a:xfrm>
-            <a:prstGeom prst="line">
-              <a:avLst/>
-            </a:prstGeom>
-            <a:noFill/>
-            <a:ln w="25400">
-              <a:solidFill>
-                <a:schemeClr val="tx1"/>
-              </a:solidFill>
-              <a:round/>
-              <a:headEnd/>
-              <a:tailEnd/>
-            </a:ln>
-            <a:extLst>
-              <a:ext uri="{909E8E84-426E-40DD-AFC4-6F175D3DCCD1}">
-                <a14:hiddenFill xmlns:a14="http://schemas.microsoft.com/office/drawing/2010/main">
-                  <a:noFill/>
-                </a14:hiddenFill>
-              </a:ext>
-            </a:extLst>
-          </p:spPr>
-          <p:txBody>
-            <a:bodyPr wrap="none" lIns="0" tIns="0" rIns="0" bIns="0" anchor="ctr">
-              <a:spAutoFit/>
-            </a:bodyPr>
-            <a:lstStyle/>
-            <a:p>
-              <a:endParaRPr lang="en-US"/>
-            </a:p>
-          </p:txBody>
-        </p:sp>
-        <p:sp>
-          <p:nvSpPr>
-            <p:cNvPr id="111" name="Line 180">
-              <a:extLst>
-                <a:ext uri="{FF2B5EF4-FFF2-40B4-BE49-F238E27FC236}">
-                  <a16:creationId xmlns:a16="http://schemas.microsoft.com/office/drawing/2014/main" id="{178EABF3-4B62-4426-8431-92039CDD25F4}"/>
-                </a:ext>
-              </a:extLst>
-            </p:cNvPr>
-            <p:cNvSpPr>
-              <a:spLocks noChangeShapeType="1"/>
-            </p:cNvSpPr>
-            <p:nvPr/>
-          </p:nvSpPr>
-          <p:spPr bwMode="auto">
-            <a:xfrm>
-              <a:off x="1181" y="5442"/>
-              <a:ext cx="0" cy="181"/>
-            </a:xfrm>
-            <a:prstGeom prst="line">
-              <a:avLst/>
-            </a:prstGeom>
-            <a:noFill/>
-            <a:ln w="25400">
-              <a:solidFill>
-                <a:schemeClr val="tx1"/>
-              </a:solidFill>
-              <a:round/>
-              <a:headEnd/>
-              <a:tailEnd/>
-            </a:ln>
-            <a:extLst>
-              <a:ext uri="{909E8E84-426E-40DD-AFC4-6F175D3DCCD1}">
-                <a14:hiddenFill xmlns:a14="http://schemas.microsoft.com/office/drawing/2010/main">
-                  <a:noFill/>
-                </a14:hiddenFill>
-              </a:ext>
-            </a:extLst>
-          </p:spPr>
-          <p:txBody>
-            <a:bodyPr wrap="none" lIns="0" tIns="0" rIns="0" bIns="0" anchor="ctr">
-              <a:spAutoFit/>
-            </a:bodyPr>
-            <a:lstStyle/>
-            <a:p>
-              <a:endParaRPr lang="en-US"/>
-            </a:p>
-          </p:txBody>
-        </p:sp>
       </p:grpSp>
       <p:grpSp>
         <p:nvGrpSpPr>
@@ -9291,7 +8772,7 @@
         </p:nvGrpSpPr>
         <p:grpSpPr bwMode="auto">
           <a:xfrm>
-            <a:off x="1844776" y="4250325"/>
+            <a:off x="1844776" y="4528279"/>
             <a:ext cx="288925" cy="787400"/>
             <a:chOff x="1008" y="2592"/>
             <a:chExt cx="182" cy="496"/>
@@ -9724,7 +9205,7 @@
         </p:nvGrpSpPr>
         <p:grpSpPr bwMode="auto">
           <a:xfrm>
-            <a:off x="3732212" y="4370203"/>
+            <a:off x="3732212" y="4648157"/>
             <a:ext cx="287338" cy="787400"/>
             <a:chOff x="2208" y="240"/>
             <a:chExt cx="181" cy="496"/>
@@ -10134,7 +9615,7 @@
         </p:nvGrpSpPr>
         <p:grpSpPr bwMode="auto">
           <a:xfrm flipH="1">
-            <a:off x="4140199" y="4334421"/>
+            <a:off x="4140199" y="4612375"/>
             <a:ext cx="287338" cy="787400"/>
             <a:chOff x="2208" y="240"/>
             <a:chExt cx="181" cy="496"/>
@@ -10775,7 +10256,7 @@
         </p:nvGrpSpPr>
         <p:grpSpPr bwMode="auto">
           <a:xfrm>
-            <a:off x="1995589" y="4545384"/>
+            <a:off x="1995589" y="4823338"/>
             <a:ext cx="254000" cy="904875"/>
             <a:chOff x="-676" y="1589"/>
             <a:chExt cx="160" cy="570"/>
@@ -12428,7 +11909,7 @@
         </p:nvGrpSpPr>
         <p:grpSpPr bwMode="auto">
           <a:xfrm>
-            <a:off x="3950484" y="4745409"/>
+            <a:off x="3950484" y="5023363"/>
             <a:ext cx="360363" cy="838200"/>
             <a:chOff x="-2155" y="1485"/>
             <a:chExt cx="227" cy="528"/>
@@ -14638,7 +14119,7 @@
         </p:nvSpPr>
         <p:spPr bwMode="auto">
           <a:xfrm>
-            <a:off x="2286895" y="4922182"/>
+            <a:off x="2286895" y="5200136"/>
             <a:ext cx="1675505" cy="774349"/>
           </a:xfrm>
           <a:prstGeom prst="rect">
@@ -16426,6 +15907,475 @@
           </p:txBody>
         </p:sp>
       </p:grpSp>
+      <p:grpSp>
+        <p:nvGrpSpPr>
+          <p:cNvPr id="195" name="Group 194">
+            <a:extLst>
+              <a:ext uri="{FF2B5EF4-FFF2-40B4-BE49-F238E27FC236}">
+                <a16:creationId xmlns:a16="http://schemas.microsoft.com/office/drawing/2014/main" id="{EF7D975B-CBF0-437E-A946-A4F3E6DBD852}"/>
+              </a:ext>
+            </a:extLst>
+          </p:cNvPr>
+          <p:cNvGrpSpPr/>
+          <p:nvPr/>
+        </p:nvGrpSpPr>
+        <p:grpSpPr>
+          <a:xfrm>
+            <a:off x="876373" y="5894023"/>
+            <a:ext cx="268136" cy="192317"/>
+            <a:chOff x="-2113628" y="7503096"/>
+            <a:chExt cx="268136" cy="192317"/>
+          </a:xfrm>
+        </p:grpSpPr>
+        <p:cxnSp>
+          <p:nvCxnSpPr>
+            <p:cNvPr id="196" name="Straight Connector 195">
+              <a:extLst>
+                <a:ext uri="{FF2B5EF4-FFF2-40B4-BE49-F238E27FC236}">
+                  <a16:creationId xmlns:a16="http://schemas.microsoft.com/office/drawing/2014/main" id="{DE98DCAF-A780-4C25-96CA-12FE747ED945}"/>
+                </a:ext>
+              </a:extLst>
+            </p:cNvPr>
+            <p:cNvCxnSpPr>
+              <a:cxnSpLocks/>
+            </p:cNvCxnSpPr>
+            <p:nvPr/>
+          </p:nvCxnSpPr>
+          <p:spPr>
+            <a:xfrm flipH="1">
+              <a:off x="-2113628" y="7503097"/>
+              <a:ext cx="245473" cy="0"/>
+            </a:xfrm>
+            <a:prstGeom prst="line">
+              <a:avLst/>
+            </a:prstGeom>
+            <a:ln>
+              <a:solidFill>
+                <a:srgbClr val="FF0000"/>
+              </a:solidFill>
+            </a:ln>
+            <a:effectLst/>
+          </p:spPr>
+          <p:style>
+            <a:lnRef idx="2">
+              <a:schemeClr val="accent1"/>
+            </a:lnRef>
+            <a:fillRef idx="0">
+              <a:schemeClr val="accent1"/>
+            </a:fillRef>
+            <a:effectRef idx="1">
+              <a:schemeClr val="accent1"/>
+            </a:effectRef>
+            <a:fontRef idx="minor">
+              <a:schemeClr val="tx1"/>
+            </a:fontRef>
+          </p:style>
+        </p:cxnSp>
+        <p:cxnSp>
+          <p:nvCxnSpPr>
+            <p:cNvPr id="197" name="Straight Connector 196">
+              <a:extLst>
+                <a:ext uri="{FF2B5EF4-FFF2-40B4-BE49-F238E27FC236}">
+                  <a16:creationId xmlns:a16="http://schemas.microsoft.com/office/drawing/2014/main" id="{DE49879C-E98F-4757-ABDE-80FAD04E5FD5}"/>
+                </a:ext>
+              </a:extLst>
+            </p:cNvPr>
+            <p:cNvCxnSpPr>
+              <a:cxnSpLocks/>
+            </p:cNvCxnSpPr>
+            <p:nvPr/>
+          </p:nvCxnSpPr>
+          <p:spPr>
+            <a:xfrm flipH="1">
+              <a:off x="-2090965" y="7695413"/>
+              <a:ext cx="245473" cy="0"/>
+            </a:xfrm>
+            <a:prstGeom prst="line">
+              <a:avLst/>
+            </a:prstGeom>
+            <a:ln>
+              <a:solidFill>
+                <a:srgbClr val="FF0000"/>
+              </a:solidFill>
+            </a:ln>
+            <a:effectLst/>
+          </p:spPr>
+          <p:style>
+            <a:lnRef idx="2">
+              <a:schemeClr val="accent1"/>
+            </a:lnRef>
+            <a:fillRef idx="0">
+              <a:schemeClr val="accent1"/>
+            </a:fillRef>
+            <a:effectRef idx="1">
+              <a:schemeClr val="accent1"/>
+            </a:effectRef>
+            <a:fontRef idx="minor">
+              <a:schemeClr val="tx1"/>
+            </a:fontRef>
+          </p:style>
+        </p:cxnSp>
+        <p:cxnSp>
+          <p:nvCxnSpPr>
+            <p:cNvPr id="198" name="Straight Connector 197">
+              <a:extLst>
+                <a:ext uri="{FF2B5EF4-FFF2-40B4-BE49-F238E27FC236}">
+                  <a16:creationId xmlns:a16="http://schemas.microsoft.com/office/drawing/2014/main" id="{D5EEBB7C-F56E-4002-A497-74ED0D1EBED4}"/>
+                </a:ext>
+              </a:extLst>
+            </p:cNvPr>
+            <p:cNvCxnSpPr>
+              <a:cxnSpLocks/>
+            </p:cNvCxnSpPr>
+            <p:nvPr/>
+          </p:nvCxnSpPr>
+          <p:spPr>
+            <a:xfrm>
+              <a:off x="-1880954" y="7503097"/>
+              <a:ext cx="0" cy="172751"/>
+            </a:xfrm>
+            <a:prstGeom prst="line">
+              <a:avLst/>
+            </a:prstGeom>
+            <a:ln>
+              <a:solidFill>
+                <a:srgbClr val="FF0000"/>
+              </a:solidFill>
+            </a:ln>
+            <a:effectLst/>
+          </p:spPr>
+          <p:style>
+            <a:lnRef idx="2">
+              <a:schemeClr val="accent1"/>
+            </a:lnRef>
+            <a:fillRef idx="0">
+              <a:schemeClr val="accent1"/>
+            </a:fillRef>
+            <a:effectRef idx="1">
+              <a:schemeClr val="accent1"/>
+            </a:effectRef>
+            <a:fontRef idx="minor">
+              <a:schemeClr val="tx1"/>
+            </a:fontRef>
+          </p:style>
+        </p:cxnSp>
+        <p:cxnSp>
+          <p:nvCxnSpPr>
+            <p:cNvPr id="199" name="Straight Connector 198">
+              <a:extLst>
+                <a:ext uri="{FF2B5EF4-FFF2-40B4-BE49-F238E27FC236}">
+                  <a16:creationId xmlns:a16="http://schemas.microsoft.com/office/drawing/2014/main" id="{A01833D6-1A81-401C-A56C-BC5FA53070DD}"/>
+                </a:ext>
+              </a:extLst>
+            </p:cNvPr>
+            <p:cNvCxnSpPr>
+              <a:cxnSpLocks/>
+            </p:cNvCxnSpPr>
+            <p:nvPr/>
+          </p:nvCxnSpPr>
+          <p:spPr>
+            <a:xfrm>
+              <a:off x="-2084142" y="7503096"/>
+              <a:ext cx="0" cy="172751"/>
+            </a:xfrm>
+            <a:prstGeom prst="line">
+              <a:avLst/>
+            </a:prstGeom>
+            <a:ln>
+              <a:solidFill>
+                <a:srgbClr val="FF0000"/>
+              </a:solidFill>
+            </a:ln>
+            <a:effectLst/>
+          </p:spPr>
+          <p:style>
+            <a:lnRef idx="2">
+              <a:schemeClr val="accent1"/>
+            </a:lnRef>
+            <a:fillRef idx="0">
+              <a:schemeClr val="accent1"/>
+            </a:fillRef>
+            <a:effectRef idx="1">
+              <a:schemeClr val="accent1"/>
+            </a:effectRef>
+            <a:fontRef idx="minor">
+              <a:schemeClr val="tx1"/>
+            </a:fontRef>
+          </p:style>
+        </p:cxnSp>
+      </p:grpSp>
+      <p:sp>
+        <p:nvSpPr>
+          <p:cNvPr id="200" name="TextBox 199">
+            <a:extLst>
+              <a:ext uri="{FF2B5EF4-FFF2-40B4-BE49-F238E27FC236}">
+                <a16:creationId xmlns:a16="http://schemas.microsoft.com/office/drawing/2014/main" id="{8A684761-E503-4C32-8823-1B360C18A285}"/>
+              </a:ext>
+            </a:extLst>
+          </p:cNvPr>
+          <p:cNvSpPr txBox="1"/>
+          <p:nvPr/>
+        </p:nvSpPr>
+        <p:spPr>
+          <a:xfrm>
+            <a:off x="691373" y="5498094"/>
+            <a:ext cx="1700285" cy="369332"/>
+          </a:xfrm>
+          <a:prstGeom prst="rect">
+            <a:avLst/>
+          </a:prstGeom>
+          <a:noFill/>
+          <a:effectLst/>
+        </p:spPr>
+        <p:txBody>
+          <a:bodyPr wrap="square" rtlCol="0">
+            <a:spAutoFit/>
+          </a:bodyPr>
+          <a:lstStyle/>
+          <a:p>
+            <a:r>
+              <a:rPr lang="en-US" b="1" dirty="0"/>
+              <a:t>Drop Area</a:t>
+            </a:r>
+          </a:p>
+        </p:txBody>
+      </p:sp>
+      <p:grpSp>
+        <p:nvGrpSpPr>
+          <p:cNvPr id="201" name="Group 200">
+            <a:extLst>
+              <a:ext uri="{FF2B5EF4-FFF2-40B4-BE49-F238E27FC236}">
+                <a16:creationId xmlns:a16="http://schemas.microsoft.com/office/drawing/2014/main" id="{C2C8DAC4-7379-4EE0-A78C-79273CD805E5}"/>
+              </a:ext>
+            </a:extLst>
+          </p:cNvPr>
+          <p:cNvGrpSpPr/>
+          <p:nvPr/>
+        </p:nvGrpSpPr>
+        <p:grpSpPr>
+          <a:xfrm>
+            <a:off x="1568336" y="9180283"/>
+            <a:ext cx="268136" cy="192317"/>
+            <a:chOff x="-2113628" y="7503096"/>
+            <a:chExt cx="268136" cy="192317"/>
+          </a:xfrm>
+        </p:grpSpPr>
+        <p:cxnSp>
+          <p:nvCxnSpPr>
+            <p:cNvPr id="202" name="Straight Connector 201">
+              <a:extLst>
+                <a:ext uri="{FF2B5EF4-FFF2-40B4-BE49-F238E27FC236}">
+                  <a16:creationId xmlns:a16="http://schemas.microsoft.com/office/drawing/2014/main" id="{56BD2E1A-9A59-499C-BCC1-6CBB2482D909}"/>
+                </a:ext>
+              </a:extLst>
+            </p:cNvPr>
+            <p:cNvCxnSpPr>
+              <a:cxnSpLocks/>
+            </p:cNvCxnSpPr>
+            <p:nvPr/>
+          </p:nvCxnSpPr>
+          <p:spPr>
+            <a:xfrm flipH="1">
+              <a:off x="-2113628" y="7503097"/>
+              <a:ext cx="245473" cy="0"/>
+            </a:xfrm>
+            <a:prstGeom prst="line">
+              <a:avLst/>
+            </a:prstGeom>
+            <a:ln>
+              <a:solidFill>
+                <a:srgbClr val="FF0000"/>
+              </a:solidFill>
+            </a:ln>
+            <a:effectLst/>
+          </p:spPr>
+          <p:style>
+            <a:lnRef idx="2">
+              <a:schemeClr val="accent1"/>
+            </a:lnRef>
+            <a:fillRef idx="0">
+              <a:schemeClr val="accent1"/>
+            </a:fillRef>
+            <a:effectRef idx="1">
+              <a:schemeClr val="accent1"/>
+            </a:effectRef>
+            <a:fontRef idx="minor">
+              <a:schemeClr val="tx1"/>
+            </a:fontRef>
+          </p:style>
+        </p:cxnSp>
+        <p:cxnSp>
+          <p:nvCxnSpPr>
+            <p:cNvPr id="203" name="Straight Connector 202">
+              <a:extLst>
+                <a:ext uri="{FF2B5EF4-FFF2-40B4-BE49-F238E27FC236}">
+                  <a16:creationId xmlns:a16="http://schemas.microsoft.com/office/drawing/2014/main" id="{A17A728F-696A-4E5A-AFF3-815ADBFFF177}"/>
+                </a:ext>
+              </a:extLst>
+            </p:cNvPr>
+            <p:cNvCxnSpPr>
+              <a:cxnSpLocks/>
+            </p:cNvCxnSpPr>
+            <p:nvPr/>
+          </p:nvCxnSpPr>
+          <p:spPr>
+            <a:xfrm flipH="1">
+              <a:off x="-2090965" y="7695413"/>
+              <a:ext cx="245473" cy="0"/>
+            </a:xfrm>
+            <a:prstGeom prst="line">
+              <a:avLst/>
+            </a:prstGeom>
+            <a:ln>
+              <a:solidFill>
+                <a:srgbClr val="FF0000"/>
+              </a:solidFill>
+            </a:ln>
+            <a:effectLst/>
+          </p:spPr>
+          <p:style>
+            <a:lnRef idx="2">
+              <a:schemeClr val="accent1"/>
+            </a:lnRef>
+            <a:fillRef idx="0">
+              <a:schemeClr val="accent1"/>
+            </a:fillRef>
+            <a:effectRef idx="1">
+              <a:schemeClr val="accent1"/>
+            </a:effectRef>
+            <a:fontRef idx="minor">
+              <a:schemeClr val="tx1"/>
+            </a:fontRef>
+          </p:style>
+        </p:cxnSp>
+        <p:cxnSp>
+          <p:nvCxnSpPr>
+            <p:cNvPr id="204" name="Straight Connector 203">
+              <a:extLst>
+                <a:ext uri="{FF2B5EF4-FFF2-40B4-BE49-F238E27FC236}">
+                  <a16:creationId xmlns:a16="http://schemas.microsoft.com/office/drawing/2014/main" id="{F6BB9902-52B3-47DE-BE5E-96911C3A4098}"/>
+                </a:ext>
+              </a:extLst>
+            </p:cNvPr>
+            <p:cNvCxnSpPr>
+              <a:cxnSpLocks/>
+            </p:cNvCxnSpPr>
+            <p:nvPr/>
+          </p:nvCxnSpPr>
+          <p:spPr>
+            <a:xfrm>
+              <a:off x="-1880954" y="7503097"/>
+              <a:ext cx="0" cy="172751"/>
+            </a:xfrm>
+            <a:prstGeom prst="line">
+              <a:avLst/>
+            </a:prstGeom>
+            <a:ln>
+              <a:solidFill>
+                <a:srgbClr val="FF0000"/>
+              </a:solidFill>
+            </a:ln>
+            <a:effectLst/>
+          </p:spPr>
+          <p:style>
+            <a:lnRef idx="2">
+              <a:schemeClr val="accent1"/>
+            </a:lnRef>
+            <a:fillRef idx="0">
+              <a:schemeClr val="accent1"/>
+            </a:fillRef>
+            <a:effectRef idx="1">
+              <a:schemeClr val="accent1"/>
+            </a:effectRef>
+            <a:fontRef idx="minor">
+              <a:schemeClr val="tx1"/>
+            </a:fontRef>
+          </p:style>
+        </p:cxnSp>
+        <p:cxnSp>
+          <p:nvCxnSpPr>
+            <p:cNvPr id="205" name="Straight Connector 204">
+              <a:extLst>
+                <a:ext uri="{FF2B5EF4-FFF2-40B4-BE49-F238E27FC236}">
+                  <a16:creationId xmlns:a16="http://schemas.microsoft.com/office/drawing/2014/main" id="{7A23A62A-BACF-4A6B-A2B4-3ABBCFEEE098}"/>
+                </a:ext>
+              </a:extLst>
+            </p:cNvPr>
+            <p:cNvCxnSpPr>
+              <a:cxnSpLocks/>
+            </p:cNvCxnSpPr>
+            <p:nvPr/>
+          </p:nvCxnSpPr>
+          <p:spPr>
+            <a:xfrm>
+              <a:off x="-2084142" y="7503096"/>
+              <a:ext cx="0" cy="172751"/>
+            </a:xfrm>
+            <a:prstGeom prst="line">
+              <a:avLst/>
+            </a:prstGeom>
+            <a:ln>
+              <a:solidFill>
+                <a:srgbClr val="FF0000"/>
+              </a:solidFill>
+            </a:ln>
+            <a:effectLst/>
+          </p:spPr>
+          <p:style>
+            <a:lnRef idx="2">
+              <a:schemeClr val="accent1"/>
+            </a:lnRef>
+            <a:fillRef idx="0">
+              <a:schemeClr val="accent1"/>
+            </a:fillRef>
+            <a:effectRef idx="1">
+              <a:schemeClr val="accent1"/>
+            </a:effectRef>
+            <a:fontRef idx="minor">
+              <a:schemeClr val="tx1"/>
+            </a:fontRef>
+          </p:style>
+        </p:cxnSp>
+      </p:grpSp>
+      <p:sp>
+        <p:nvSpPr>
+          <p:cNvPr id="206" name="TextBox 205">
+            <a:extLst>
+              <a:ext uri="{FF2B5EF4-FFF2-40B4-BE49-F238E27FC236}">
+                <a16:creationId xmlns:a16="http://schemas.microsoft.com/office/drawing/2014/main" id="{1FF917BB-BF61-4732-804D-FAFE1A27F843}"/>
+              </a:ext>
+            </a:extLst>
+          </p:cNvPr>
+          <p:cNvSpPr txBox="1"/>
+          <p:nvPr/>
+        </p:nvSpPr>
+        <p:spPr>
+          <a:xfrm>
+            <a:off x="1843295" y="9081992"/>
+            <a:ext cx="1700285" cy="646331"/>
+          </a:xfrm>
+          <a:prstGeom prst="rect">
+            <a:avLst/>
+          </a:prstGeom>
+          <a:noFill/>
+          <a:effectLst/>
+        </p:spPr>
+        <p:txBody>
+          <a:bodyPr wrap="square" rtlCol="0">
+            <a:spAutoFit/>
+          </a:bodyPr>
+          <a:lstStyle/>
+          <a:p>
+            <a:r>
+              <a:rPr lang="en-US" b="1" dirty="0"/>
+              <a:t>Start Timer</a:t>
+            </a:r>
+          </a:p>
+          <a:p>
+            <a:endParaRPr lang="en-US" b="1" dirty="0"/>
+          </a:p>
+        </p:txBody>
+      </p:sp>
     </p:spTree>
   </p:cSld>
   <p:clrMapOvr>

</xml_diff>